<commit_message>
Removed some redundant slides from deck, integrated basic toats into solution and added mock logos
</commit_message>
<xml_diff>
--- a/Presentation/UWP Apps DX Hack.pptx
+++ b/Presentation/UWP Apps DX Hack.pptx
@@ -5,18 +5,16 @@
     <p:sldMasterId id="2147483648" r:id="rId1"/>
   </p:sldMasterIdLst>
   <p:notesMasterIdLst>
-    <p:notesMasterId r:id="rId11"/>
+    <p:notesMasterId r:id="rId9"/>
   </p:notesMasterIdLst>
   <p:sldIdLst>
     <p:sldId id="257" r:id="rId2"/>
-    <p:sldId id="258" r:id="rId3"/>
-    <p:sldId id="261" r:id="rId4"/>
-    <p:sldId id="260" r:id="rId5"/>
-    <p:sldId id="262" r:id="rId6"/>
-    <p:sldId id="259" r:id="rId7"/>
-    <p:sldId id="256" r:id="rId8"/>
-    <p:sldId id="264" r:id="rId9"/>
-    <p:sldId id="263" r:id="rId10"/>
+    <p:sldId id="261" r:id="rId3"/>
+    <p:sldId id="260" r:id="rId4"/>
+    <p:sldId id="262" r:id="rId5"/>
+    <p:sldId id="256" r:id="rId6"/>
+    <p:sldId id="264" r:id="rId7"/>
+    <p:sldId id="263" r:id="rId8"/>
   </p:sldIdLst>
   <p:sldSz cx="12192000" cy="6858000"/>
   <p:notesSz cx="6858000" cy="9144000"/>
@@ -115,6 +113,11 @@
       </a:defRPr>
     </a:lvl9pPr>
   </p:defaultTextStyle>
+  <p:extLst>
+    <p:ext uri="{EFAFB233-063F-42B5-8137-9DF3F51BA10A}">
+      <p15:sldGuideLst xmlns:p15="http://schemas.microsoft.com/office/powerpoint/2012/main"/>
+    </p:ext>
+  </p:extLst>
 </p:presentation>
 </file>
 
@@ -200,7 +203,7 @@
           <a:p>
             <a:fld id="{080C0D8D-C001-4576-8F01-B2686A888A0C}" type="datetimeFigureOut">
               <a:rPr lang="en-GB" smtClean="0"/>
-              <a:t>18/11/2015</a:t>
+              <a:t>19/11/2015</a:t>
             </a:fld>
             <a:endParaRPr lang="en-GB"/>
           </a:p>
@@ -656,7 +659,7 @@
           <a:p>
             <a:fld id="{6D0596E5-6523-4DD8-A9ED-0418BD42519C}" type="datetime8">
               <a:rPr lang="en-US" smtClean="0"/>
-              <a:t>11/18/2015 9:00 PM</a:t>
+              <a:t>11/19/2015 9:07 AM</a:t>
             </a:fld>
             <a:endParaRPr lang="en-US" dirty="0"/>
           </a:p>
@@ -749,13 +752,8 @@
             </a:r>
             <a:r>
               <a:rPr lang="en-US" baseline="0" dirty="0" smtClean="0"/>
-              <a:t> is a Technical Evangelist at Microsoft?</a:t>
+              <a:t> does Microsoft offer students?</a:t>
             </a:r>
-          </a:p>
-          <a:p>
-            <a:endParaRPr lang="en-US" dirty="0" smtClean="0"/>
-          </a:p>
-          <a:p>
             <a:endParaRPr lang="en-US" dirty="0"/>
           </a:p>
         </p:txBody>
@@ -848,9 +846,9 @@
           <a:bodyPr/>
           <a:lstStyle/>
           <a:p>
-            <a:fld id="{7D10C09F-FCA1-48C8-B40D-42E1045D109E}" type="datetime8">
+            <a:fld id="{04C85F9D-EC93-40E1-9411-512368376E79}" type="datetime8">
               <a:rPr lang="en-US" smtClean="0"/>
-              <a:t>11/18/2015 9:00 PM</a:t>
+              <a:t>11/19/2015 9:07 AM</a:t>
             </a:fld>
             <a:endParaRPr lang="en-US" dirty="0"/>
           </a:p>
@@ -883,7 +881,7 @@
     </p:spTree>
     <p:extLst>
       <p:ext uri="{BB962C8B-B14F-4D97-AF65-F5344CB8AC3E}">
-        <p14:creationId xmlns:p14="http://schemas.microsoft.com/office/powerpoint/2010/main" val="4222003394"/>
+        <p14:creationId xmlns:p14="http://schemas.microsoft.com/office/powerpoint/2010/main" val="2258475991"/>
       </p:ext>
     </p:extLst>
   </p:cSld>
@@ -1039,7 +1037,7 @@
           <a:p>
             <a:fld id="{04C85F9D-EC93-40E1-9411-512368376E79}" type="datetime8">
               <a:rPr lang="en-US" smtClean="0"/>
-              <a:t>11/18/2015 9:03 PM</a:t>
+              <a:t>11/19/2015 9:07 AM</a:t>
             </a:fld>
             <a:endParaRPr lang="en-US" dirty="0"/>
           </a:p>
@@ -1063,196 +1061,7 @@
             <a:fld id="{B4008EB6-D09E-4580-8CD6-DDB14511944F}" type="slidenum">
               <a:rPr lang="en-US" smtClean="0"/>
               <a:pPr/>
-              <a:t>3</a:t>
-            </a:fld>
-            <a:endParaRPr lang="en-US" dirty="0"/>
-          </a:p>
-        </p:txBody>
-      </p:sp>
-    </p:spTree>
-    <p:extLst>
-      <p:ext uri="{BB962C8B-B14F-4D97-AF65-F5344CB8AC3E}">
-        <p14:creationId xmlns:p14="http://schemas.microsoft.com/office/powerpoint/2010/main" val="2258475991"/>
-      </p:ext>
-    </p:extLst>
-  </p:cSld>
-  <p:clrMapOvr>
-    <a:masterClrMapping/>
-  </p:clrMapOvr>
-</p:notes>
-</file>
-
-<file path=ppt/notesSlides/notesSlide4.xml><?xml version="1.0" encoding="utf-8"?>
-<p:notes xmlns:a="http://schemas.openxmlformats.org/drawingml/2006/main" xmlns:r="http://schemas.openxmlformats.org/officeDocument/2006/relationships" xmlns:p="http://schemas.openxmlformats.org/presentationml/2006/main">
-  <p:cSld>
-    <p:spTree>
-      <p:nvGrpSpPr>
-        <p:cNvPr id="1" name=""/>
-        <p:cNvGrpSpPr/>
-        <p:nvPr/>
-      </p:nvGrpSpPr>
-      <p:grpSpPr>
-        <a:xfrm>
-          <a:off x="0" y="0"/>
-          <a:ext cx="0" cy="0"/>
-          <a:chOff x="0" y="0"/>
-          <a:chExt cx="0" cy="0"/>
-        </a:xfrm>
-      </p:grpSpPr>
-      <p:sp>
-        <p:nvSpPr>
-          <p:cNvPr id="2" name="Slide Image Placeholder 1"/>
-          <p:cNvSpPr>
-            <a:spLocks noGrp="1" noRot="1" noChangeAspect="1"/>
-          </p:cNvSpPr>
-          <p:nvPr>
-            <p:ph type="sldImg"/>
-          </p:nvPr>
-        </p:nvSpPr>
-        <p:spPr/>
-      </p:sp>
-      <p:sp>
-        <p:nvSpPr>
-          <p:cNvPr id="3" name="Notes Placeholder 2"/>
-          <p:cNvSpPr>
-            <a:spLocks noGrp="1"/>
-          </p:cNvSpPr>
-          <p:nvPr>
-            <p:ph type="body" idx="1"/>
-          </p:nvPr>
-        </p:nvSpPr>
-        <p:spPr/>
-        <p:txBody>
-          <a:bodyPr/>
-          <a:lstStyle/>
-          <a:p>
-            <a:r>
-              <a:rPr lang="en-US" dirty="0" smtClean="0"/>
-              <a:t>What</a:t>
-            </a:r>
-            <a:r>
-              <a:rPr lang="en-US" baseline="0" dirty="0" smtClean="0"/>
-              <a:t> does Microsoft offer students?</a:t>
-            </a:r>
-            <a:endParaRPr lang="en-US" dirty="0"/>
-          </a:p>
-        </p:txBody>
-      </p:sp>
-      <p:sp>
-        <p:nvSpPr>
-          <p:cNvPr id="4" name="Header Placeholder 3"/>
-          <p:cNvSpPr>
-            <a:spLocks noGrp="1"/>
-          </p:cNvSpPr>
-          <p:nvPr>
-            <p:ph type="hdr" sz="quarter" idx="10"/>
-          </p:nvPr>
-        </p:nvSpPr>
-        <p:spPr/>
-        <p:txBody>
-          <a:bodyPr/>
-          <a:lstStyle/>
-          <a:p>
-            <a:endParaRPr lang="en-US" dirty="0"/>
-          </a:p>
-        </p:txBody>
-      </p:sp>
-      <p:sp>
-        <p:nvSpPr>
-          <p:cNvPr id="5" name="Footer Placeholder 4"/>
-          <p:cNvSpPr>
-            <a:spLocks noGrp="1"/>
-          </p:cNvSpPr>
-          <p:nvPr>
-            <p:ph type="ftr" sz="quarter" idx="11"/>
-          </p:nvPr>
-        </p:nvSpPr>
-        <p:spPr/>
-        <p:txBody>
-          <a:bodyPr/>
-          <a:lstStyle/>
-          <a:p>
-            <a:pPr defTabSz="914099" eaLnBrk="0" hangingPunct="0"/>
-            <a:r>
-              <a:rPr lang="en-US" sz="400" smtClean="0">
-                <a:gradFill>
-                  <a:gsLst>
-                    <a:gs pos="0">
-                      <a:prstClr val="black"/>
-                    </a:gs>
-                    <a:gs pos="100000">
-                      <a:prstClr val="black"/>
-                    </a:gs>
-                  </a:gsLst>
-                  <a:lin ang="5400000" scaled="0"/>
-                </a:gradFill>
-                <a:latin typeface="Segoe UI" pitchFamily="34" charset="0"/>
-                <a:ea typeface="Segoe UI" pitchFamily="34" charset="0"/>
-                <a:cs typeface="Segoe UI" pitchFamily="34" charset="0"/>
-              </a:rPr>
-              <a:t>© 2014 Microsoft Corporation. All rights reserved. MICROSOFT MAKES NO WARRANTIES, EXPRESS, IMPLIED OR STATUTORY, AS TO THE INFORMATION IN THIS PRESENTATION.</a:t>
-            </a:r>
-            <a:endParaRPr lang="en-US" sz="400" dirty="0" smtClean="0">
-              <a:gradFill>
-                <a:gsLst>
-                  <a:gs pos="0">
-                    <a:prstClr val="black"/>
-                  </a:gs>
-                  <a:gs pos="100000">
-                    <a:prstClr val="black"/>
-                  </a:gs>
-                </a:gsLst>
-                <a:lin ang="5400000" scaled="0"/>
-              </a:gradFill>
-              <a:latin typeface="Segoe UI" pitchFamily="34" charset="0"/>
-              <a:ea typeface="Segoe UI" pitchFamily="34" charset="0"/>
-              <a:cs typeface="Segoe UI" pitchFamily="34" charset="0"/>
-            </a:endParaRPr>
-          </a:p>
-        </p:txBody>
-      </p:sp>
-      <p:sp>
-        <p:nvSpPr>
-          <p:cNvPr id="6" name="Date Placeholder 5"/>
-          <p:cNvSpPr>
-            <a:spLocks noGrp="1"/>
-          </p:cNvSpPr>
-          <p:nvPr>
-            <p:ph type="dt" idx="12"/>
-          </p:nvPr>
-        </p:nvSpPr>
-        <p:spPr/>
-        <p:txBody>
-          <a:bodyPr/>
-          <a:lstStyle/>
-          <a:p>
-            <a:fld id="{04C85F9D-EC93-40E1-9411-512368376E79}" type="datetime8">
-              <a:rPr lang="en-US" smtClean="0"/>
-              <a:t>11/18/2015 9:05 PM</a:t>
-            </a:fld>
-            <a:endParaRPr lang="en-US" dirty="0"/>
-          </a:p>
-        </p:txBody>
-      </p:sp>
-      <p:sp>
-        <p:nvSpPr>
-          <p:cNvPr id="7" name="Slide Number Placeholder 6"/>
-          <p:cNvSpPr>
-            <a:spLocks noGrp="1"/>
-          </p:cNvSpPr>
-          <p:nvPr>
-            <p:ph type="sldNum" sz="quarter" idx="13"/>
-          </p:nvPr>
-        </p:nvSpPr>
-        <p:spPr/>
-        <p:txBody>
-          <a:bodyPr/>
-          <a:lstStyle/>
-          <a:p>
-            <a:fld id="{B4008EB6-D09E-4580-8CD6-DDB14511944F}" type="slidenum">
-              <a:rPr lang="en-US" smtClean="0"/>
-              <a:pPr/>
-              <a:t>5</a:t>
+              <a:t>4</a:t>
             </a:fld>
             <a:endParaRPr lang="en-US" dirty="0"/>
           </a:p>
@@ -1262,195 +1071,6 @@
     <p:extLst>
       <p:ext uri="{BB962C8B-B14F-4D97-AF65-F5344CB8AC3E}">
         <p14:creationId xmlns:p14="http://schemas.microsoft.com/office/powerpoint/2010/main" val="711769095"/>
-      </p:ext>
-    </p:extLst>
-  </p:cSld>
-  <p:clrMapOvr>
-    <a:masterClrMapping/>
-  </p:clrMapOvr>
-</p:notes>
-</file>
-
-<file path=ppt/notesSlides/notesSlide5.xml><?xml version="1.0" encoding="utf-8"?>
-<p:notes xmlns:a="http://schemas.openxmlformats.org/drawingml/2006/main" xmlns:r="http://schemas.openxmlformats.org/officeDocument/2006/relationships" xmlns:p="http://schemas.openxmlformats.org/presentationml/2006/main">
-  <p:cSld>
-    <p:spTree>
-      <p:nvGrpSpPr>
-        <p:cNvPr id="1" name=""/>
-        <p:cNvGrpSpPr/>
-        <p:nvPr/>
-      </p:nvGrpSpPr>
-      <p:grpSpPr>
-        <a:xfrm>
-          <a:off x="0" y="0"/>
-          <a:ext cx="0" cy="0"/>
-          <a:chOff x="0" y="0"/>
-          <a:chExt cx="0" cy="0"/>
-        </a:xfrm>
-      </p:grpSpPr>
-      <p:sp>
-        <p:nvSpPr>
-          <p:cNvPr id="2" name="Slide Image Placeholder 1"/>
-          <p:cNvSpPr>
-            <a:spLocks noGrp="1" noRot="1" noChangeAspect="1"/>
-          </p:cNvSpPr>
-          <p:nvPr>
-            <p:ph type="sldImg"/>
-          </p:nvPr>
-        </p:nvSpPr>
-        <p:spPr/>
-      </p:sp>
-      <p:sp>
-        <p:nvSpPr>
-          <p:cNvPr id="3" name="Notes Placeholder 2"/>
-          <p:cNvSpPr>
-            <a:spLocks noGrp="1"/>
-          </p:cNvSpPr>
-          <p:nvPr>
-            <p:ph type="body" idx="1"/>
-          </p:nvPr>
-        </p:nvSpPr>
-        <p:spPr/>
-        <p:txBody>
-          <a:bodyPr/>
-          <a:lstStyle/>
-          <a:p>
-            <a:r>
-              <a:rPr lang="en-US" dirty="0" smtClean="0"/>
-              <a:t>Non</a:t>
-            </a:r>
-            <a:r>
-              <a:rPr lang="en-US" baseline="0" dirty="0" smtClean="0"/>
-              <a:t> narcissistic version of my story</a:t>
-            </a:r>
-            <a:endParaRPr lang="en-US" dirty="0"/>
-          </a:p>
-        </p:txBody>
-      </p:sp>
-      <p:sp>
-        <p:nvSpPr>
-          <p:cNvPr id="4" name="Header Placeholder 3"/>
-          <p:cNvSpPr>
-            <a:spLocks noGrp="1"/>
-          </p:cNvSpPr>
-          <p:nvPr>
-            <p:ph type="hdr" sz="quarter" idx="10"/>
-          </p:nvPr>
-        </p:nvSpPr>
-        <p:spPr/>
-        <p:txBody>
-          <a:bodyPr/>
-          <a:lstStyle/>
-          <a:p>
-            <a:endParaRPr lang="en-US" dirty="0"/>
-          </a:p>
-        </p:txBody>
-      </p:sp>
-      <p:sp>
-        <p:nvSpPr>
-          <p:cNvPr id="5" name="Footer Placeholder 4"/>
-          <p:cNvSpPr>
-            <a:spLocks noGrp="1"/>
-          </p:cNvSpPr>
-          <p:nvPr>
-            <p:ph type="ftr" sz="quarter" idx="11"/>
-          </p:nvPr>
-        </p:nvSpPr>
-        <p:spPr/>
-        <p:txBody>
-          <a:bodyPr/>
-          <a:lstStyle/>
-          <a:p>
-            <a:pPr defTabSz="914099" eaLnBrk="0" hangingPunct="0"/>
-            <a:r>
-              <a:rPr lang="en-US" sz="400" smtClean="0">
-                <a:gradFill>
-                  <a:gsLst>
-                    <a:gs pos="0">
-                      <a:prstClr val="black"/>
-                    </a:gs>
-                    <a:gs pos="100000">
-                      <a:prstClr val="black"/>
-                    </a:gs>
-                  </a:gsLst>
-                  <a:lin ang="5400000" scaled="0"/>
-                </a:gradFill>
-                <a:latin typeface="Segoe UI" pitchFamily="34" charset="0"/>
-                <a:ea typeface="Segoe UI" pitchFamily="34" charset="0"/>
-                <a:cs typeface="Segoe UI" pitchFamily="34" charset="0"/>
-              </a:rPr>
-              <a:t>© 2014 Microsoft Corporation. All rights reserved. MICROSOFT MAKES NO WARRANTIES, EXPRESS, IMPLIED OR STATUTORY, AS TO THE INFORMATION IN THIS PRESENTATION.</a:t>
-            </a:r>
-            <a:endParaRPr lang="en-US" sz="400" dirty="0" smtClean="0">
-              <a:gradFill>
-                <a:gsLst>
-                  <a:gs pos="0">
-                    <a:prstClr val="black"/>
-                  </a:gs>
-                  <a:gs pos="100000">
-                    <a:prstClr val="black"/>
-                  </a:gs>
-                </a:gsLst>
-                <a:lin ang="5400000" scaled="0"/>
-              </a:gradFill>
-              <a:latin typeface="Segoe UI" pitchFamily="34" charset="0"/>
-              <a:ea typeface="Segoe UI" pitchFamily="34" charset="0"/>
-              <a:cs typeface="Segoe UI" pitchFamily="34" charset="0"/>
-            </a:endParaRPr>
-          </a:p>
-        </p:txBody>
-      </p:sp>
-      <p:sp>
-        <p:nvSpPr>
-          <p:cNvPr id="6" name="Date Placeholder 5"/>
-          <p:cNvSpPr>
-            <a:spLocks noGrp="1"/>
-          </p:cNvSpPr>
-          <p:nvPr>
-            <p:ph type="dt" idx="12"/>
-          </p:nvPr>
-        </p:nvSpPr>
-        <p:spPr/>
-        <p:txBody>
-          <a:bodyPr/>
-          <a:lstStyle/>
-          <a:p>
-            <a:fld id="{7D10C09F-FCA1-48C8-B40D-42E1045D109E}" type="datetime8">
-              <a:rPr lang="en-US" smtClean="0"/>
-              <a:t>11/18/2015 9:00 PM</a:t>
-            </a:fld>
-            <a:endParaRPr lang="en-US" dirty="0"/>
-          </a:p>
-        </p:txBody>
-      </p:sp>
-      <p:sp>
-        <p:nvSpPr>
-          <p:cNvPr id="7" name="Slide Number Placeholder 6"/>
-          <p:cNvSpPr>
-            <a:spLocks noGrp="1"/>
-          </p:cNvSpPr>
-          <p:nvPr>
-            <p:ph type="sldNum" sz="quarter" idx="13"/>
-          </p:nvPr>
-        </p:nvSpPr>
-        <p:spPr/>
-        <p:txBody>
-          <a:bodyPr/>
-          <a:lstStyle/>
-          <a:p>
-            <a:fld id="{B4008EB6-D09E-4580-8CD6-DDB14511944F}" type="slidenum">
-              <a:rPr lang="en-US" smtClean="0"/>
-              <a:pPr/>
-              <a:t>6</a:t>
-            </a:fld>
-            <a:endParaRPr lang="en-US" dirty="0"/>
-          </a:p>
-        </p:txBody>
-      </p:sp>
-    </p:spTree>
-    <p:extLst>
-      <p:ext uri="{BB962C8B-B14F-4D97-AF65-F5344CB8AC3E}">
-        <p14:creationId xmlns:p14="http://schemas.microsoft.com/office/powerpoint/2010/main" val="2862074739"/>
       </p:ext>
     </p:extLst>
   </p:cSld>
@@ -1591,7 +1211,7 @@
           <a:p>
             <a:fld id="{A6D536CA-C157-46DA-81C0-1AE1A7B641A2}" type="datetimeFigureOut">
               <a:rPr lang="en-GB" smtClean="0"/>
-              <a:t>18/11/2015</a:t>
+              <a:t>19/11/2015</a:t>
             </a:fld>
             <a:endParaRPr lang="en-GB"/>
           </a:p>
@@ -1761,7 +1381,7 @@
           <a:p>
             <a:fld id="{A6D536CA-C157-46DA-81C0-1AE1A7B641A2}" type="datetimeFigureOut">
               <a:rPr lang="en-GB" smtClean="0"/>
-              <a:t>18/11/2015</a:t>
+              <a:t>19/11/2015</a:t>
             </a:fld>
             <a:endParaRPr lang="en-GB"/>
           </a:p>
@@ -1941,7 +1561,7 @@
           <a:p>
             <a:fld id="{A6D536CA-C157-46DA-81C0-1AE1A7B641A2}" type="datetimeFigureOut">
               <a:rPr lang="en-GB" smtClean="0"/>
-              <a:t>18/11/2015</a:t>
+              <a:t>19/11/2015</a:t>
             </a:fld>
             <a:endParaRPr lang="en-GB"/>
           </a:p>
@@ -28287,7 +27907,7 @@
           <a:p>
             <a:fld id="{A6D536CA-C157-46DA-81C0-1AE1A7B641A2}" type="datetimeFigureOut">
               <a:rPr lang="en-GB" smtClean="0"/>
-              <a:t>18/11/2015</a:t>
+              <a:t>19/11/2015</a:t>
             </a:fld>
             <a:endParaRPr lang="en-GB"/>
           </a:p>
@@ -28533,7 +28153,7 @@
           <a:p>
             <a:fld id="{A6D536CA-C157-46DA-81C0-1AE1A7B641A2}" type="datetimeFigureOut">
               <a:rPr lang="en-GB" smtClean="0"/>
-              <a:t>18/11/2015</a:t>
+              <a:t>19/11/2015</a:t>
             </a:fld>
             <a:endParaRPr lang="en-GB"/>
           </a:p>
@@ -28765,7 +28385,7 @@
           <a:p>
             <a:fld id="{A6D536CA-C157-46DA-81C0-1AE1A7B641A2}" type="datetimeFigureOut">
               <a:rPr lang="en-GB" smtClean="0"/>
-              <a:t>18/11/2015</a:t>
+              <a:t>19/11/2015</a:t>
             </a:fld>
             <a:endParaRPr lang="en-GB"/>
           </a:p>
@@ -29132,7 +28752,7 @@
           <a:p>
             <a:fld id="{A6D536CA-C157-46DA-81C0-1AE1A7B641A2}" type="datetimeFigureOut">
               <a:rPr lang="en-GB" smtClean="0"/>
-              <a:t>18/11/2015</a:t>
+              <a:t>19/11/2015</a:t>
             </a:fld>
             <a:endParaRPr lang="en-GB"/>
           </a:p>
@@ -29250,7 +28870,7 @@
           <a:p>
             <a:fld id="{A6D536CA-C157-46DA-81C0-1AE1A7B641A2}" type="datetimeFigureOut">
               <a:rPr lang="en-GB" smtClean="0"/>
-              <a:t>18/11/2015</a:t>
+              <a:t>19/11/2015</a:t>
             </a:fld>
             <a:endParaRPr lang="en-GB"/>
           </a:p>
@@ -29345,7 +28965,7 @@
           <a:p>
             <a:fld id="{A6D536CA-C157-46DA-81C0-1AE1A7B641A2}" type="datetimeFigureOut">
               <a:rPr lang="en-GB" smtClean="0"/>
-              <a:t>18/11/2015</a:t>
+              <a:t>19/11/2015</a:t>
             </a:fld>
             <a:endParaRPr lang="en-GB"/>
           </a:p>
@@ -29622,7 +29242,7 @@
           <a:p>
             <a:fld id="{A6D536CA-C157-46DA-81C0-1AE1A7B641A2}" type="datetimeFigureOut">
               <a:rPr lang="en-GB" smtClean="0"/>
-              <a:t>18/11/2015</a:t>
+              <a:t>19/11/2015</a:t>
             </a:fld>
             <a:endParaRPr lang="en-GB"/>
           </a:p>
@@ -29875,7 +29495,7 @@
           <a:p>
             <a:fld id="{A6D536CA-C157-46DA-81C0-1AE1A7B641A2}" type="datetimeFigureOut">
               <a:rPr lang="en-GB" smtClean="0"/>
-              <a:t>18/11/2015</a:t>
+              <a:t>19/11/2015</a:t>
             </a:fld>
             <a:endParaRPr lang="en-GB"/>
           </a:p>
@@ -30088,7 +29708,7 @@
           <a:p>
             <a:fld id="{A6D536CA-C157-46DA-81C0-1AE1A7B641A2}" type="datetimeFigureOut">
               <a:rPr lang="en-GB" smtClean="0"/>
-              <a:t>18/11/2015</a:t>
+              <a:t>19/11/2015</a:t>
             </a:fld>
             <a:endParaRPr lang="en-GB"/>
           </a:p>
@@ -30530,14 +30150,7 @@
                 <a:latin typeface="Segoe UI" panose="020B0502040204020203" pitchFamily="34" charset="0"/>
                 <a:cs typeface="Segoe UI" panose="020B0502040204020203" pitchFamily="34" charset="0"/>
               </a:rPr>
-              <a:t>November 2015</a:t>
-            </a:r>
-            <a:r>
-              <a:rPr lang="en-US" dirty="0" smtClean="0">
-                <a:latin typeface="Segoe UI" panose="020B0502040204020203" pitchFamily="34" charset="0"/>
-                <a:cs typeface="Segoe UI" panose="020B0502040204020203" pitchFamily="34" charset="0"/>
-              </a:rPr>
-              <a:t> </a:t>
+              <a:t>November 2015 </a:t>
             </a:r>
             <a:r>
               <a:rPr lang="en-US" dirty="0" smtClean="0"/>
@@ -30572,10 +30185,6 @@
               </a:rPr>
               <a:t>Team Beats</a:t>
             </a:r>
-            <a:endParaRPr lang="en-US" sz="5400" dirty="0" smtClean="0">
-              <a:latin typeface="Segoe UI" panose="020B0502040204020203" pitchFamily="34" charset="0"/>
-              <a:cs typeface="Segoe UI" panose="020B0502040204020203" pitchFamily="34" charset="0"/>
-            </a:endParaRPr>
           </a:p>
         </p:txBody>
       </p:sp>
@@ -30608,124 +30217,6 @@
 </file>
 
 <file path=ppt/slides/slide2.xml><?xml version="1.0" encoding="utf-8"?>
-<p:sld xmlns:a="http://schemas.openxmlformats.org/drawingml/2006/main" xmlns:r="http://schemas.openxmlformats.org/officeDocument/2006/relationships" xmlns:p="http://schemas.openxmlformats.org/presentationml/2006/main">
-  <p:cSld>
-    <p:spTree>
-      <p:nvGrpSpPr>
-        <p:cNvPr id="1" name=""/>
-        <p:cNvGrpSpPr/>
-        <p:nvPr/>
-      </p:nvGrpSpPr>
-      <p:grpSpPr>
-        <a:xfrm>
-          <a:off x="0" y="0"/>
-          <a:ext cx="0" cy="0"/>
-          <a:chOff x="0" y="0"/>
-          <a:chExt cx="0" cy="0"/>
-        </a:xfrm>
-      </p:grpSpPr>
-      <p:sp>
-        <p:nvSpPr>
-          <p:cNvPr id="2" name="Title 1"/>
-          <p:cNvSpPr>
-            <a:spLocks noGrp="1"/>
-          </p:cNvSpPr>
-          <p:nvPr>
-            <p:ph type="title"/>
-          </p:nvPr>
-        </p:nvSpPr>
-        <p:spPr>
-          <a:xfrm>
-            <a:off x="269240" y="2084363"/>
-            <a:ext cx="9638754" cy="1158629"/>
-          </a:xfrm>
-        </p:spPr>
-        <p:txBody>
-          <a:bodyPr/>
-          <a:lstStyle/>
-          <a:p>
-            <a:r>
-              <a:rPr lang="en-US" dirty="0" smtClean="0"/>
-              <a:t> </a:t>
-            </a:r>
-            <a:r>
-              <a:rPr lang="en-US" dirty="0" smtClean="0">
-                <a:latin typeface="Segoe UI" panose="020B0502040204020203" pitchFamily="34" charset="0"/>
-                <a:cs typeface="Segoe UI" panose="020B0502040204020203" pitchFamily="34" charset="0"/>
-              </a:rPr>
-              <a:t>Technical what</a:t>
-            </a:r>
-            <a:r>
-              <a:rPr lang="en-US" dirty="0" smtClean="0">
-                <a:latin typeface="Segoe UI" panose="020B0502040204020203" pitchFamily="34" charset="0"/>
-                <a:cs typeface="Segoe UI" panose="020B0502040204020203" pitchFamily="34" charset="0"/>
-              </a:rPr>
-              <a:t>?</a:t>
-            </a:r>
-            <a:endParaRPr lang="en-US" dirty="0">
-              <a:latin typeface="Segoe UI" panose="020B0502040204020203" pitchFamily="34" charset="0"/>
-              <a:cs typeface="Segoe UI" panose="020B0502040204020203" pitchFamily="34" charset="0"/>
-            </a:endParaRPr>
-          </a:p>
-        </p:txBody>
-      </p:sp>
-      <p:sp>
-        <p:nvSpPr>
-          <p:cNvPr id="3" name="Rectangle 2"/>
-          <p:cNvSpPr/>
-          <p:nvPr/>
-        </p:nvSpPr>
-        <p:spPr>
-          <a:xfrm>
-            <a:off x="10190364" y="6040922"/>
-            <a:ext cx="2594374" cy="452590"/>
-          </a:xfrm>
-          <a:prstGeom prst="rect">
-            <a:avLst/>
-          </a:prstGeom>
-        </p:spPr>
-        <p:txBody>
-          <a:bodyPr wrap="square">
-            <a:spAutoFit/>
-          </a:bodyPr>
-          <a:lstStyle/>
-          <a:p>
-            <a:r>
-              <a:rPr lang="en-GB" sz="2353" dirty="0"/>
-              <a:t>@</a:t>
-            </a:r>
-            <a:r>
-              <a:rPr lang="en-GB" sz="2353" dirty="0" err="1"/>
-              <a:t>dotjson</a:t>
-            </a:r>
-            <a:endParaRPr lang="en-GB" sz="2353" dirty="0"/>
-          </a:p>
-        </p:txBody>
-      </p:sp>
-    </p:spTree>
-    <p:extLst>
-      <p:ext uri="{BB962C8B-B14F-4D97-AF65-F5344CB8AC3E}">
-        <p14:creationId xmlns:p14="http://schemas.microsoft.com/office/powerpoint/2010/main" val="2530921537"/>
-      </p:ext>
-    </p:extLst>
-  </p:cSld>
-  <p:clrMapOvr>
-    <a:masterClrMapping/>
-  </p:clrMapOvr>
-  <p:transition spd="slow">
-    <p:push dir="u"/>
-  </p:transition>
-  <p:timing>
-    <p:tnLst>
-      <p:par>
-        <p:cTn id="1" dur="indefinite" restart="never" nodeType="tmRoot"/>
-      </p:par>
-    </p:tnLst>
-  </p:timing>
-</p:sld>
-</file>
-
-<file path=ppt/slides/slide3.xml><?xml version="1.0" encoding="utf-8"?>
 <p:sld xmlns:a="http://schemas.openxmlformats.org/drawingml/2006/main" xmlns:r="http://schemas.openxmlformats.org/officeDocument/2006/relationships" xmlns:p="http://schemas.openxmlformats.org/presentationml/2006/main">
   <p:cSld>
     <p:spTree>
@@ -31539,14 +31030,7 @@
                 <a:latin typeface="Segoe UI" panose="020B0502040204020203" pitchFamily="34" charset="0"/>
                 <a:cs typeface="Segoe UI" panose="020B0502040204020203" pitchFamily="34" charset="0"/>
               </a:rPr>
-              <a:t>H</a:t>
-            </a:r>
-            <a:r>
-              <a:rPr lang="en-GB" sz="2400" dirty="0" smtClean="0">
-                <a:latin typeface="Segoe UI" panose="020B0502040204020203" pitchFamily="34" charset="0"/>
-                <a:cs typeface="Segoe UI" panose="020B0502040204020203" pitchFamily="34" charset="0"/>
-              </a:rPr>
-              <a:t>ammer home the concept of the Universal Windows Platform.</a:t>
+              <a:t>Hammer home the concept of the Universal Windows Platform.</a:t>
             </a:r>
             <a:endParaRPr lang="en-GB" sz="2353" b="1" dirty="0">
               <a:gradFill>
@@ -31606,11 +31090,11 @@
   <p:clrMapOvr>
     <a:masterClrMapping/>
   </p:clrMapOvr>
-  <mc:AlternateContent xmlns:mc="http://schemas.openxmlformats.org/markup-compatibility/2006">
-    <mc:Choice xmlns:p14="http://schemas.microsoft.com/office/powerpoint/2010/main" Requires="p14">
+  <mc:AlternateContent xmlns:mc="http://schemas.openxmlformats.org/markup-compatibility/2006" xmlns:p14="http://schemas.microsoft.com/office/powerpoint/2010/main">
+    <mc:Choice Requires="p14">
       <p:transition p14:dur="0"/>
     </mc:Choice>
-    <mc:Fallback>
+    <mc:Fallback xmlns="">
       <p:transition/>
     </mc:Fallback>
   </mc:AlternateContent>
@@ -31624,7 +31108,7 @@
 </p:sld>
 </file>
 
-<file path=ppt/slides/slide4.xml><?xml version="1.0" encoding="utf-8"?>
+<file path=ppt/slides/slide3.xml><?xml version="1.0" encoding="utf-8"?>
 <p:sld xmlns:a="http://schemas.openxmlformats.org/drawingml/2006/main" xmlns:r="http://schemas.openxmlformats.org/officeDocument/2006/relationships" xmlns:p="http://schemas.openxmlformats.org/presentationml/2006/main">
   <p:cSld>
     <p:spTree>
@@ -31674,11 +31158,11 @@
   <p:clrMapOvr>
     <a:masterClrMapping/>
   </p:clrMapOvr>
-  <mc:AlternateContent xmlns:mc="http://schemas.openxmlformats.org/markup-compatibility/2006">
-    <mc:Choice xmlns:p14="http://schemas.microsoft.com/office/powerpoint/2010/main" Requires="p14">
+  <mc:AlternateContent xmlns:mc="http://schemas.openxmlformats.org/markup-compatibility/2006" xmlns:p14="http://schemas.microsoft.com/office/powerpoint/2010/main">
+    <mc:Choice Requires="p14">
       <p:transition p14:dur="0"/>
     </mc:Choice>
-    <mc:Fallback>
+    <mc:Fallback xmlns="">
       <p:transition/>
     </mc:Fallback>
   </mc:AlternateContent>
@@ -31692,7 +31176,7 @@
 </p:sld>
 </file>
 
-<file path=ppt/slides/slide5.xml><?xml version="1.0" encoding="utf-8"?>
+<file path=ppt/slides/slide4.xml><?xml version="1.0" encoding="utf-8"?>
 <p:sld xmlns:a="http://schemas.openxmlformats.org/drawingml/2006/main" xmlns:r="http://schemas.openxmlformats.org/officeDocument/2006/relationships" xmlns:p="http://schemas.openxmlformats.org/presentationml/2006/main">
   <p:cSld>
     <p:spTree>
@@ -32586,11 +32070,11 @@
   <p:clrMapOvr>
     <a:masterClrMapping/>
   </p:clrMapOvr>
-  <mc:AlternateContent xmlns:mc="http://schemas.openxmlformats.org/markup-compatibility/2006">
-    <mc:Choice xmlns:p14="http://schemas.microsoft.com/office/powerpoint/2010/main" Requires="p14">
+  <mc:AlternateContent xmlns:mc="http://schemas.openxmlformats.org/markup-compatibility/2006" xmlns:p14="http://schemas.microsoft.com/office/powerpoint/2010/main">
+    <mc:Choice Requires="p14">
       <p:transition p14:dur="0"/>
     </mc:Choice>
-    <mc:Fallback>
+    <mc:Fallback xmlns="">
       <p:transition/>
     </mc:Fallback>
   </mc:AlternateContent>
@@ -32604,263 +32088,7 @@
 </p:sld>
 </file>
 
-<file path=ppt/slides/slide6.xml><?xml version="1.0" encoding="utf-8"?>
-<p:sld xmlns:a="http://schemas.openxmlformats.org/drawingml/2006/main" xmlns:r="http://schemas.openxmlformats.org/officeDocument/2006/relationships" xmlns:p="http://schemas.openxmlformats.org/presentationml/2006/main">
-  <p:cSld>
-    <p:spTree>
-      <p:nvGrpSpPr>
-        <p:cNvPr id="1" name=""/>
-        <p:cNvGrpSpPr/>
-        <p:nvPr/>
-      </p:nvGrpSpPr>
-      <p:grpSpPr>
-        <a:xfrm>
-          <a:off x="0" y="0"/>
-          <a:ext cx="0" cy="0"/>
-          <a:chOff x="0" y="0"/>
-          <a:chExt cx="0" cy="0"/>
-        </a:xfrm>
-      </p:grpSpPr>
-      <p:sp>
-        <p:nvSpPr>
-          <p:cNvPr id="2" name="Title 1"/>
-          <p:cNvSpPr>
-            <a:spLocks noGrp="1"/>
-          </p:cNvSpPr>
-          <p:nvPr>
-            <p:ph type="title"/>
-          </p:nvPr>
-        </p:nvSpPr>
-        <p:spPr>
-          <a:xfrm>
-            <a:off x="269239" y="2084363"/>
-            <a:ext cx="11653523" cy="2136222"/>
-          </a:xfrm>
-        </p:spPr>
-        <p:txBody>
-          <a:bodyPr/>
-          <a:lstStyle/>
-          <a:p>
-            <a:r>
-              <a:rPr lang="en-US" dirty="0" smtClean="0"/>
-              <a:t>How did </a:t>
-            </a:r>
-            <a:r>
-              <a:rPr lang="en-US" dirty="0" smtClean="0"/>
-              <a:t>we </a:t>
-            </a:r>
-            <a:r>
-              <a:rPr lang="en-US" dirty="0" smtClean="0"/>
-              <a:t>get here?</a:t>
-            </a:r>
-            <a:br>
-              <a:rPr lang="en-US" dirty="0" smtClean="0"/>
-            </a:br>
-            <a:endParaRPr lang="en-US" dirty="0"/>
-          </a:p>
-        </p:txBody>
-      </p:sp>
-      <p:sp>
-        <p:nvSpPr>
-          <p:cNvPr id="3" name="Rectangle 2"/>
-          <p:cNvSpPr/>
-          <p:nvPr/>
-        </p:nvSpPr>
-        <p:spPr>
-          <a:xfrm>
-            <a:off x="10190364" y="6040922"/>
-            <a:ext cx="2594374" cy="452590"/>
-          </a:xfrm>
-          <a:prstGeom prst="rect">
-            <a:avLst/>
-          </a:prstGeom>
-        </p:spPr>
-        <p:txBody>
-          <a:bodyPr wrap="square">
-            <a:spAutoFit/>
-          </a:bodyPr>
-          <a:lstStyle/>
-          <a:p>
-            <a:r>
-              <a:rPr lang="en-GB" sz="2353" dirty="0"/>
-              <a:t>@</a:t>
-            </a:r>
-            <a:r>
-              <a:rPr lang="en-GB" sz="2353" dirty="0" err="1"/>
-              <a:t>dotjson</a:t>
-            </a:r>
-            <a:endParaRPr lang="en-GB" sz="2353" dirty="0"/>
-          </a:p>
-        </p:txBody>
-      </p:sp>
-      <p:sp>
-        <p:nvSpPr>
-          <p:cNvPr id="4" name="TextBox 3"/>
-          <p:cNvSpPr txBox="1"/>
-          <p:nvPr/>
-        </p:nvSpPr>
-        <p:spPr>
-          <a:xfrm>
-            <a:off x="248970" y="3005445"/>
-            <a:ext cx="6516161" cy="669826"/>
-          </a:xfrm>
-          <a:prstGeom prst="rect">
-            <a:avLst/>
-          </a:prstGeom>
-          <a:noFill/>
-        </p:spPr>
-        <p:txBody>
-          <a:bodyPr wrap="square" lIns="179285" tIns="143428" rIns="179285" bIns="143428" rtlCol="0">
-            <a:spAutoFit/>
-          </a:bodyPr>
-          <a:lstStyle/>
-          <a:p>
-            <a:pPr>
-              <a:lnSpc>
-                <a:spcPct val="90000"/>
-              </a:lnSpc>
-              <a:spcAft>
-                <a:spcPts val="588"/>
-              </a:spcAft>
-            </a:pPr>
-            <a:r>
-              <a:rPr lang="en-US" sz="1568" dirty="0">
-                <a:latin typeface="+mj-lt"/>
-              </a:rPr>
-              <a:t> </a:t>
-            </a:r>
-            <a:r>
-              <a:rPr lang="en-US" sz="2745" dirty="0">
-                <a:latin typeface="+mj-lt"/>
-              </a:rPr>
-              <a:t>Yes, on the train</a:t>
-            </a:r>
-            <a:r>
-              <a:rPr lang="en-US" sz="2745" dirty="0" smtClean="0">
-                <a:latin typeface="+mj-lt"/>
-              </a:rPr>
-              <a:t>… on a plane and by tube </a:t>
-            </a:r>
-            <a:endParaRPr lang="en-GB" sz="2745" dirty="0" err="1">
-              <a:gradFill>
-                <a:gsLst>
-                  <a:gs pos="2917">
-                    <a:schemeClr val="tx1"/>
-                  </a:gs>
-                  <a:gs pos="30000">
-                    <a:schemeClr val="tx1"/>
-                  </a:gs>
-                </a:gsLst>
-                <a:lin ang="5400000" scaled="0"/>
-              </a:gradFill>
-              <a:latin typeface="+mj-lt"/>
-            </a:endParaRPr>
-          </a:p>
-        </p:txBody>
-      </p:sp>
-    </p:spTree>
-    <p:extLst>
-      <p:ext uri="{BB962C8B-B14F-4D97-AF65-F5344CB8AC3E}">
-        <p14:creationId xmlns:p14="http://schemas.microsoft.com/office/powerpoint/2010/main" val="2228293841"/>
-      </p:ext>
-    </p:extLst>
-  </p:cSld>
-  <p:clrMapOvr>
-    <a:masterClrMapping/>
-  </p:clrMapOvr>
-  <p:transition spd="slow">
-    <p:push dir="r"/>
-  </p:transition>
-  <p:timing>
-    <p:tnLst>
-      <p:par>
-        <p:cTn id="1" dur="indefinite" restart="never" nodeType="tmRoot">
-          <p:childTnLst>
-            <p:seq concurrent="1" nextAc="seek">
-              <p:cTn id="2" dur="indefinite" nodeType="mainSeq">
-                <p:childTnLst>
-                  <p:par>
-                    <p:cTn id="3" fill="hold">
-                      <p:stCondLst>
-                        <p:cond delay="indefinite"/>
-                      </p:stCondLst>
-                      <p:childTnLst>
-                        <p:par>
-                          <p:cTn id="4" fill="hold">
-                            <p:stCondLst>
-                              <p:cond delay="0"/>
-                            </p:stCondLst>
-                            <p:childTnLst>
-                              <p:par>
-                                <p:cTn id="5" presetID="10" presetClass="entr" presetSubtype="0" fill="hold" grpId="0" nodeType="clickEffect">
-                                  <p:stCondLst>
-                                    <p:cond delay="0"/>
-                                  </p:stCondLst>
-                                  <p:childTnLst>
-                                    <p:set>
-                                      <p:cBhvr>
-                                        <p:cTn id="6" dur="1" fill="hold">
-                                          <p:stCondLst>
-                                            <p:cond delay="0"/>
-                                          </p:stCondLst>
-                                        </p:cTn>
-                                        <p:tgtEl>
-                                          <p:spTgt spid="4"/>
-                                        </p:tgtEl>
-                                        <p:attrNameLst>
-                                          <p:attrName>style.visibility</p:attrName>
-                                        </p:attrNameLst>
-                                      </p:cBhvr>
-                                      <p:to>
-                                        <p:strVal val="visible"/>
-                                      </p:to>
-                                    </p:set>
-                                    <p:animEffect transition="in" filter="fade">
-                                      <p:cBhvr>
-                                        <p:cTn id="7" dur="500"/>
-                                        <p:tgtEl>
-                                          <p:spTgt spid="4"/>
-                                        </p:tgtEl>
-                                      </p:cBhvr>
-                                    </p:animEffect>
-                                  </p:childTnLst>
-                                </p:cTn>
-                              </p:par>
-                            </p:childTnLst>
-                          </p:cTn>
-                        </p:par>
-                      </p:childTnLst>
-                    </p:cTn>
-                  </p:par>
-                </p:childTnLst>
-              </p:cTn>
-              <p:prevCondLst>
-                <p:cond evt="onPrev" delay="0">
-                  <p:tgtEl>
-                    <p:sldTgt/>
-                  </p:tgtEl>
-                </p:cond>
-              </p:prevCondLst>
-              <p:nextCondLst>
-                <p:cond evt="onNext" delay="0">
-                  <p:tgtEl>
-                    <p:sldTgt/>
-                  </p:tgtEl>
-                </p:cond>
-              </p:nextCondLst>
-            </p:seq>
-          </p:childTnLst>
-        </p:cTn>
-      </p:par>
-    </p:tnLst>
-    <p:bldLst>
-      <p:bldP spid="4" grpId="0"/>
-    </p:bldLst>
-  </p:timing>
-</p:sld>
-</file>
-
-<file path=ppt/slides/slide7.xml><?xml version="1.0" encoding="utf-8"?>
+<file path=ppt/slides/slide5.xml><?xml version="1.0" encoding="utf-8"?>
 <p:sld xmlns:a="http://schemas.openxmlformats.org/drawingml/2006/main" xmlns:r="http://schemas.openxmlformats.org/officeDocument/2006/relationships" xmlns:p="http://schemas.openxmlformats.org/presentationml/2006/main">
   <p:cSld>
     <p:spTree>
@@ -33387,7 +32615,7 @@
 </p:sld>
 </file>
 
-<file path=ppt/slides/slide8.xml><?xml version="1.0" encoding="utf-8"?>
+<file path=ppt/slides/slide6.xml><?xml version="1.0" encoding="utf-8"?>
 <p:sld xmlns:a="http://schemas.openxmlformats.org/drawingml/2006/main" xmlns:r="http://schemas.openxmlformats.org/officeDocument/2006/relationships" xmlns:p="http://schemas.openxmlformats.org/presentationml/2006/main">
   <p:cSld>
     <p:spTree>
@@ -33572,7 +32800,7 @@
 </p:sld>
 </file>
 
-<file path=ppt/slides/slide9.xml><?xml version="1.0" encoding="utf-8"?>
+<file path=ppt/slides/slide7.xml><?xml version="1.0" encoding="utf-8"?>
 <p:sld xmlns:a="http://schemas.openxmlformats.org/drawingml/2006/main" xmlns:r="http://schemas.openxmlformats.org/officeDocument/2006/relationships" xmlns:p="http://schemas.openxmlformats.org/presentationml/2006/main">
   <p:cSld>
     <p:spTree>

</xml_diff>